<commit_message>
Trnadfer of all our files
</commit_message>
<xml_diff>
--- a/SEM_RAPPORT/SEM_presentation_1.pptx
+++ b/SEM_RAPPORT/SEM_presentation_1.pptx
@@ -296,7 +296,7 @@
           <a:p>
             <a:fld id="{0245BE22-E2B0-A94B-99B8-AC426212F255}" type="datetimeFigureOut">
               <a:rPr lang="en-US" smtClean="0"/>
-              <a:t>2014-11-16</a:t>
+              <a:t>2014-11-17</a:t>
             </a:fld>
             <a:endParaRPr lang="en-US"/>
           </a:p>
@@ -466,7 +466,7 @@
           <a:p>
             <a:fld id="{0245BE22-E2B0-A94B-99B8-AC426212F255}" type="datetimeFigureOut">
               <a:rPr lang="en-US" smtClean="0"/>
-              <a:t>2014-11-16</a:t>
+              <a:t>2014-11-17</a:t>
             </a:fld>
             <a:endParaRPr lang="en-US"/>
           </a:p>
@@ -646,7 +646,7 @@
           <a:p>
             <a:fld id="{0245BE22-E2B0-A94B-99B8-AC426212F255}" type="datetimeFigureOut">
               <a:rPr lang="en-US" smtClean="0"/>
-              <a:t>2014-11-16</a:t>
+              <a:t>2014-11-17</a:t>
             </a:fld>
             <a:endParaRPr lang="en-US"/>
           </a:p>
@@ -816,7 +816,7 @@
           <a:p>
             <a:fld id="{0245BE22-E2B0-A94B-99B8-AC426212F255}" type="datetimeFigureOut">
               <a:rPr lang="en-US" smtClean="0"/>
-              <a:t>2014-11-16</a:t>
+              <a:t>2014-11-17</a:t>
             </a:fld>
             <a:endParaRPr lang="en-US"/>
           </a:p>
@@ -1062,7 +1062,7 @@
           <a:p>
             <a:fld id="{0245BE22-E2B0-A94B-99B8-AC426212F255}" type="datetimeFigureOut">
               <a:rPr lang="en-US" smtClean="0"/>
-              <a:t>2014-11-16</a:t>
+              <a:t>2014-11-17</a:t>
             </a:fld>
             <a:endParaRPr lang="en-US"/>
           </a:p>
@@ -1350,7 +1350,7 @@
           <a:p>
             <a:fld id="{0245BE22-E2B0-A94B-99B8-AC426212F255}" type="datetimeFigureOut">
               <a:rPr lang="en-US" smtClean="0"/>
-              <a:t>2014-11-16</a:t>
+              <a:t>2014-11-17</a:t>
             </a:fld>
             <a:endParaRPr lang="en-US"/>
           </a:p>
@@ -1772,7 +1772,7 @@
           <a:p>
             <a:fld id="{0245BE22-E2B0-A94B-99B8-AC426212F255}" type="datetimeFigureOut">
               <a:rPr lang="en-US" smtClean="0"/>
-              <a:t>2014-11-16</a:t>
+              <a:t>2014-11-17</a:t>
             </a:fld>
             <a:endParaRPr lang="en-US"/>
           </a:p>
@@ -1890,7 +1890,7 @@
           <a:p>
             <a:fld id="{0245BE22-E2B0-A94B-99B8-AC426212F255}" type="datetimeFigureOut">
               <a:rPr lang="en-US" smtClean="0"/>
-              <a:t>2014-11-16</a:t>
+              <a:t>2014-11-17</a:t>
             </a:fld>
             <a:endParaRPr lang="en-US"/>
           </a:p>
@@ -1985,7 +1985,7 @@
           <a:p>
             <a:fld id="{0245BE22-E2B0-A94B-99B8-AC426212F255}" type="datetimeFigureOut">
               <a:rPr lang="en-US" smtClean="0"/>
-              <a:t>2014-11-16</a:t>
+              <a:t>2014-11-17</a:t>
             </a:fld>
             <a:endParaRPr lang="en-US"/>
           </a:p>
@@ -2262,7 +2262,7 @@
           <a:p>
             <a:fld id="{0245BE22-E2B0-A94B-99B8-AC426212F255}" type="datetimeFigureOut">
               <a:rPr lang="en-US" smtClean="0"/>
-              <a:t>2014-11-16</a:t>
+              <a:t>2014-11-17</a:t>
             </a:fld>
             <a:endParaRPr lang="en-US"/>
           </a:p>
@@ -2515,7 +2515,7 @@
           <a:p>
             <a:fld id="{0245BE22-E2B0-A94B-99B8-AC426212F255}" type="datetimeFigureOut">
               <a:rPr lang="en-US" smtClean="0"/>
-              <a:t>2014-11-16</a:t>
+              <a:t>2014-11-17</a:t>
             </a:fld>
             <a:endParaRPr lang="en-US"/>
           </a:p>
@@ -2728,7 +2728,7 @@
           <a:p>
             <a:fld id="{0245BE22-E2B0-A94B-99B8-AC426212F255}" type="datetimeFigureOut">
               <a:rPr lang="en-US" smtClean="0"/>
-              <a:t>2014-11-16</a:t>
+              <a:t>2014-11-17</a:t>
             </a:fld>
             <a:endParaRPr lang="en-US"/>
           </a:p>
@@ -3296,22 +3296,54 @@
           <a:p>
             <a:r>
               <a:rPr lang="en-US" dirty="0" smtClean="0"/>
-              <a:t>Maintain balance in pitch a</a:t>
+              <a:t>Maintain balance in </a:t>
             </a:r>
             <a:r>
               <a:rPr lang="en-US" dirty="0" smtClean="0"/>
-              <a:t>nd</a:t>
+              <a:t>forward and backward</a:t>
             </a:r>
             <a:r>
               <a:rPr lang="en-US" dirty="0" smtClean="0"/>
-              <a:t> roll direction</a:t>
-            </a:r>
-          </a:p>
-          <a:p>
+              <a:t> </a:t>
+            </a:r>
             <a:r>
               <a:rPr lang="en-US" dirty="0" smtClean="0"/>
-              <a:t>Withstand disturbances e.g. pushes at the robot</a:t>
-            </a:r>
+              <a:t>and </a:t>
+            </a:r>
+            <a:r>
+              <a:rPr lang="en-US" dirty="0" smtClean="0"/>
+              <a:t>left, right</a:t>
+            </a:r>
+            <a:r>
+              <a:rPr lang="en-US" dirty="0" smtClean="0"/>
+              <a:t> directions</a:t>
+            </a:r>
+            <a:endParaRPr lang="en-US" dirty="0" smtClean="0"/>
+          </a:p>
+          <a:p>
+            <a:r>
+              <a:rPr lang="en-US" dirty="0" smtClean="0"/>
+              <a:t>Withstand disturbances e.g. pushes at the </a:t>
+            </a:r>
+            <a:r>
+              <a:rPr lang="en-US" dirty="0" smtClean="0"/>
+              <a:t>robot</a:t>
+            </a:r>
+          </a:p>
+          <a:p>
+            <a:r>
+              <a:rPr lang="en-US" dirty="0" smtClean="0"/>
+              <a:t>Inverted pendulum &amp; inertia wheel</a:t>
+            </a:r>
+          </a:p>
+          <a:p>
+            <a:r>
+              <a:rPr lang="en-US" dirty="0" smtClean="0"/>
+              <a:t>Inverted pendulum &amp; wheel at bottom</a:t>
+            </a:r>
+          </a:p>
+          <a:p>
+            <a:endParaRPr lang="en-US" dirty="0" smtClean="0"/>
           </a:p>
           <a:p>
             <a:endParaRPr lang="en-US" dirty="0"/>
@@ -3490,15 +3522,19 @@
           <a:p>
             <a:r>
               <a:rPr lang="en-US" dirty="0" smtClean="0"/>
-              <a:t>Make use of prior knowledge to </a:t>
-            </a:r>
-            <a:r>
-              <a:rPr lang="en-US" dirty="0" err="1" smtClean="0"/>
-              <a:t>simular</a:t>
+              <a:t>Make use of prior knowledge </a:t>
+            </a:r>
+            <a:r>
+              <a:rPr lang="en-US" smtClean="0"/>
+              <a:t>to </a:t>
+            </a:r>
+            <a:r>
+              <a:rPr lang="en-US" smtClean="0"/>
+              <a:t>similar </a:t>
             </a:r>
             <a:r>
               <a:rPr lang="en-US" dirty="0" smtClean="0"/>
-              <a:t> processes</a:t>
+              <a:t>processes</a:t>
             </a:r>
             <a:endParaRPr lang="en-US" dirty="0"/>
           </a:p>
@@ -3653,7 +3689,7 @@
           <a:graphicData uri="http://schemas.openxmlformats.org/presentationml/2006/ole">
             <mc:AlternateContent xmlns:mc="http://schemas.openxmlformats.org/markup-compatibility/2006">
               <mc:Choice xmlns:v="urn:schemas-microsoft-com:vml" Requires="v">
-                <p:oleObj spid="_x0000_s1036" name="Equation" r:id="rId4" imgW="3009900" imgH="660400" progId="Equation.3">
+                <p:oleObj spid="_x0000_s1040" name="Equation" r:id="rId4" imgW="3009900" imgH="660400" progId="Equation.3">
                   <p:embed/>
                 </p:oleObj>
               </mc:Choice>

</xml_diff>